<commit_message>
add suggested modifications to the proposal
</commit_message>
<xml_diff>
--- a/proposal/Proposal Presentation.pptx
+++ b/proposal/Proposal Presentation.pptx
@@ -222,7 +222,7 @@
           <a:p>
             <a:fld id="{59041DB8-B66F-4DC8-A96E-33677E0F90FF}" type="datetimeFigureOut">
               <a:rPr lang="en-US" smtClean="0"/>
-              <a:t>10/30/2023</a:t>
+              <a:t>11/17/2023</a:t>
             </a:fld>
             <a:endParaRPr lang="en-US"/>
           </a:p>
@@ -387,7 +387,7 @@
           <a:p>
             <a:fld id="{DEB49C4A-65AC-492D-9701-81B46C3AD0E4}" type="datetimeFigureOut">
               <a:rPr lang="en-US" smtClean="0"/>
-              <a:t>10/30/2023</a:t>
+              <a:t>11/17/2023</a:t>
             </a:fld>
             <a:endParaRPr lang="en-US"/>
           </a:p>
@@ -3467,7 +3467,7 @@
           <a:p>
             <a:fld id="{384A29A4-78C8-47AB-BA06-22CB45938951}" type="datetime1">
               <a:rPr lang="en-US" smtClean="0"/>
-              <a:t>10/30/2023</a:t>
+              <a:t>11/17/2023</a:t>
             </a:fld>
             <a:endParaRPr lang="en-US"/>
           </a:p>
@@ -3662,7 +3662,7 @@
           <a:p>
             <a:fld id="{E1ED4ACF-2D82-46F2-A8E9-23963AA34E86}" type="datetime1">
               <a:rPr lang="en-US" smtClean="0"/>
-              <a:t>10/30/2023</a:t>
+              <a:t>11/17/2023</a:t>
             </a:fld>
             <a:endParaRPr lang="en-US"/>
           </a:p>
@@ -3846,7 +3846,7 @@
           <a:p>
             <a:fld id="{AE374B5B-21A0-4192-BF4C-38187F1A68D8}" type="datetime1">
               <a:rPr lang="en-US" smtClean="0"/>
-              <a:t>10/30/2023</a:t>
+              <a:t>11/17/2023</a:t>
             </a:fld>
             <a:endParaRPr lang="en-US"/>
           </a:p>
@@ -6187,7 +6187,7 @@
           <a:p>
             <a:fld id="{33B5CF7C-B333-48E1-A4A6-83A3C8B73AC0}" type="datetime1">
               <a:rPr lang="en-US" smtClean="0"/>
-              <a:t>10/30/2023</a:t>
+              <a:t>11/17/2023</a:t>
             </a:fld>
             <a:endParaRPr lang="en-US"/>
           </a:p>
@@ -6640,7 +6640,7 @@
           <a:p>
             <a:fld id="{AE320762-5CBF-4210-AB54-376B091119F8}" type="datetime1">
               <a:rPr lang="en-US" smtClean="0"/>
-              <a:t>10/30/2023</a:t>
+              <a:t>11/17/2023</a:t>
             </a:fld>
             <a:endParaRPr lang="en-US"/>
           </a:p>
@@ -6772,7 +6772,7 @@
           <a:p>
             <a:fld id="{7F0DB371-BF5F-4058-A212-1A908E4D2674}" type="datetime1">
               <a:rPr lang="en-US" smtClean="0"/>
-              <a:t>10/30/2023</a:t>
+              <a:t>11/17/2023</a:t>
             </a:fld>
             <a:endParaRPr lang="en-US"/>
           </a:p>
@@ -8705,7 +8705,7 @@
           <a:p>
             <a:fld id="{60A4083B-90AA-48CF-BAD5-00AA24D7F288}" type="datetime1">
               <a:rPr lang="en-US" smtClean="0"/>
-              <a:t>10/30/2023</a:t>
+              <a:t>11/17/2023</a:t>
             </a:fld>
             <a:endParaRPr lang="en-US"/>
           </a:p>
@@ -10964,7 +10964,7 @@
             <a:fld id="{F5BAF629-ECA2-4CF3-B790-9D9BDED98269}" type="datetime1">
               <a:rPr lang="en-US" smtClean="0"/>
               <a:pPr/>
-              <a:t>10/30/2023</a:t>
+              <a:t>11/17/2023</a:t>
             </a:fld>
             <a:endParaRPr lang="en-US"/>
           </a:p>
@@ -15259,7 +15259,7 @@
             <a:fld id="{B51B2453-8663-4C69-AF73-9FD7B1DEC5D0}" type="datetime1">
               <a:rPr lang="en-US" smtClean="0"/>
               <a:pPr/>
-              <a:t>10/30/2023</a:t>
+              <a:t>11/17/2023</a:t>
             </a:fld>
             <a:endParaRPr lang="en-US" dirty="0"/>
           </a:p>
@@ -16053,7 +16053,12 @@
             <p:ph type="title"/>
           </p:nvPr>
         </p:nvSpPr>
-        <p:spPr/>
+        <p:spPr>
+          <a:xfrm>
+            <a:off x="1295400" y="542485"/>
+            <a:ext cx="9601200" cy="579438"/>
+          </a:xfrm>
+        </p:spPr>
         <p:txBody>
           <a:bodyPr/>
           <a:lstStyle/>
@@ -16075,29 +16080,66 @@
             <p:ph idx="1"/>
           </p:nvPr>
         </p:nvSpPr>
-        <p:spPr/>
+        <p:spPr>
+          <a:xfrm>
+            <a:off x="1295400" y="1293779"/>
+            <a:ext cx="9601200" cy="4727642"/>
+          </a:xfrm>
+        </p:spPr>
         <p:txBody>
           <a:bodyPr>
-            <a:normAutofit/>
+            <a:normAutofit fontScale="92500" lnSpcReduction="20000"/>
           </a:bodyPr>
           <a:lstStyle/>
           <a:p>
             <a:r>
-              <a:rPr lang="en-US" sz="2800" dirty="0"/>
+              <a:rPr lang="en-US" dirty="0"/>
               <a:t>Introducing a chatbot for FAQs can be profitable for companies because this approach require less reliance on customer support.</a:t>
             </a:r>
           </a:p>
           <a:p>
             <a:r>
-              <a:rPr lang="en-US" sz="2800" dirty="0"/>
+              <a:rPr lang="en-US" dirty="0"/>
               <a:t>Companies that rely hugely on customer support can hugely benefit by this chatbot.</a:t>
             </a:r>
+          </a:p>
+          <a:p>
+            <a:r>
+              <a:rPr lang="en-US" dirty="0"/>
+              <a:t>There have been implementations using RAG(Retrieval Augmented Generation). More precisely, these models are not actually trained on the private data. FAQs are documented and embeddings for those documents are generated and these embeddings with the user question are provided to the LLM and it answers based on the embeddings</a:t>
+            </a:r>
+          </a:p>
+          <a:p>
+            <a:r>
+              <a:rPr lang="en-US" dirty="0"/>
+              <a:t>The problem </a:t>
+            </a:r>
+            <a:r>
+              <a:rPr lang="en-US"/>
+              <a:t>here is, </a:t>
+            </a:r>
+            <a:r>
+              <a:rPr lang="en-US" dirty="0"/>
+              <a:t>LLM would not remember anything about the document after the question has been answered. And for large companies, This can be an overhead for answering question because every time you need to pass these embeddings to the model and also storing and maintaining these embeddings could require additional resources. But a finetuned model which is trained on this private data does not depend on any data for questions in future. It can answer them independently. </a:t>
+            </a:r>
+          </a:p>
+          <a:p>
+            <a:r>
+              <a:rPr lang="en-US" dirty="0"/>
+              <a:t>If the model is trained once a month on the custom data, Not only does the model stay up-to-date but also this can be a lot less expensive than generating embeddings for a document. And we also do not need to worry about storing and scaling the embeddings if we choose to fine-tune.</a:t>
+            </a:r>
+          </a:p>
+          <a:p>
+            <a:endParaRPr lang="en-US" dirty="0"/>
+          </a:p>
+          <a:p>
+            <a:endParaRPr lang="en-US" dirty="0"/>
           </a:p>
           <a:p>
             <a:pPr marL="0" indent="0">
               <a:buNone/>
             </a:pPr>
-            <a:endParaRPr lang="en-US" sz="2800" dirty="0"/>
+            <a:endParaRPr lang="en-US" dirty="0"/>
           </a:p>
         </p:txBody>
       </p:sp>
@@ -16785,9 +16827,18 @@
             </a:r>
           </a:p>
           <a:p>
+            <a:pPr marL="0" indent="0">
+              <a:buNone/>
+            </a:pPr>
+            <a:r>
+              <a:rPr lang="en-US" sz="2400" b="1" u="sng" dirty="0"/>
+              <a:t>Metrics:</a:t>
+            </a:r>
+          </a:p>
+          <a:p>
             <a:r>
               <a:rPr lang="en-US" sz="2400" dirty="0"/>
-              <a:t>The code will be pushed to the GitHub with clear readme instructions.</a:t>
+              <a:t>BLEU Score.</a:t>
             </a:r>
           </a:p>
           <a:p>

</xml_diff>